<commit_message>
rebuilding site Thu Sep 30 16:15:55 MSK 2021
</commit_message>
<xml_diff>
--- a/files/presentations/Presentation.pptx
+++ b/files/presentations/Presentation.pptx
@@ -265,7 +265,7 @@
           <a:p>
             <a:fld id="{846CE7D5-CF57-46EF-B807-FDD0502418D4}" type="datetimeFigureOut">
               <a:rPr lang="en-GB" smtClean="0"/>
-              <a:t>14/09/2018</a:t>
+              <a:t>30/09/2021</a:t>
             </a:fld>
             <a:endParaRPr lang="en-GB"/>
           </a:p>
@@ -435,7 +435,7 @@
           <a:p>
             <a:fld id="{846CE7D5-CF57-46EF-B807-FDD0502418D4}" type="datetimeFigureOut">
               <a:rPr lang="en-GB" smtClean="0"/>
-              <a:t>14/09/2018</a:t>
+              <a:t>30/09/2021</a:t>
             </a:fld>
             <a:endParaRPr lang="en-GB"/>
           </a:p>
@@ -615,7 +615,7 @@
           <a:p>
             <a:fld id="{846CE7D5-CF57-46EF-B807-FDD0502418D4}" type="datetimeFigureOut">
               <a:rPr lang="en-GB" smtClean="0"/>
-              <a:t>14/09/2018</a:t>
+              <a:t>30/09/2021</a:t>
             </a:fld>
             <a:endParaRPr lang="en-GB"/>
           </a:p>
@@ -785,7 +785,7 @@
           <a:p>
             <a:fld id="{846CE7D5-CF57-46EF-B807-FDD0502418D4}" type="datetimeFigureOut">
               <a:rPr lang="en-GB" smtClean="0"/>
-              <a:t>14/09/2018</a:t>
+              <a:t>30/09/2021</a:t>
             </a:fld>
             <a:endParaRPr lang="en-GB"/>
           </a:p>
@@ -1031,7 +1031,7 @@
           <a:p>
             <a:fld id="{846CE7D5-CF57-46EF-B807-FDD0502418D4}" type="datetimeFigureOut">
               <a:rPr lang="en-GB" smtClean="0"/>
-              <a:t>14/09/2018</a:t>
+              <a:t>30/09/2021</a:t>
             </a:fld>
             <a:endParaRPr lang="en-GB"/>
           </a:p>
@@ -1263,7 +1263,7 @@
           <a:p>
             <a:fld id="{846CE7D5-CF57-46EF-B807-FDD0502418D4}" type="datetimeFigureOut">
               <a:rPr lang="en-GB" smtClean="0"/>
-              <a:t>14/09/2018</a:t>
+              <a:t>30/09/2021</a:t>
             </a:fld>
             <a:endParaRPr lang="en-GB"/>
           </a:p>
@@ -1630,7 +1630,7 @@
           <a:p>
             <a:fld id="{846CE7D5-CF57-46EF-B807-FDD0502418D4}" type="datetimeFigureOut">
               <a:rPr lang="en-GB" smtClean="0"/>
-              <a:t>14/09/2018</a:t>
+              <a:t>30/09/2021</a:t>
             </a:fld>
             <a:endParaRPr lang="en-GB"/>
           </a:p>
@@ -1748,7 +1748,7 @@
           <a:p>
             <a:fld id="{846CE7D5-CF57-46EF-B807-FDD0502418D4}" type="datetimeFigureOut">
               <a:rPr lang="en-GB" smtClean="0"/>
-              <a:t>14/09/2018</a:t>
+              <a:t>30/09/2021</a:t>
             </a:fld>
             <a:endParaRPr lang="en-GB"/>
           </a:p>
@@ -1843,7 +1843,7 @@
           <a:p>
             <a:fld id="{846CE7D5-CF57-46EF-B807-FDD0502418D4}" type="datetimeFigureOut">
               <a:rPr lang="en-GB" smtClean="0"/>
-              <a:t>14/09/2018</a:t>
+              <a:t>30/09/2021</a:t>
             </a:fld>
             <a:endParaRPr lang="en-GB"/>
           </a:p>
@@ -2120,7 +2120,7 @@
           <a:p>
             <a:fld id="{846CE7D5-CF57-46EF-B807-FDD0502418D4}" type="datetimeFigureOut">
               <a:rPr lang="en-GB" smtClean="0"/>
-              <a:t>14/09/2018</a:t>
+              <a:t>30/09/2021</a:t>
             </a:fld>
             <a:endParaRPr lang="en-GB"/>
           </a:p>
@@ -2377,7 +2377,7 @@
           <a:p>
             <a:fld id="{846CE7D5-CF57-46EF-B807-FDD0502418D4}" type="datetimeFigureOut">
               <a:rPr lang="en-GB" smtClean="0"/>
-              <a:t>14/09/2018</a:t>
+              <a:t>30/09/2021</a:t>
             </a:fld>
             <a:endParaRPr lang="en-GB"/>
           </a:p>
@@ -2590,7 +2590,7 @@
           <a:p>
             <a:fld id="{846CE7D5-CF57-46EF-B807-FDD0502418D4}" type="datetimeFigureOut">
               <a:rPr lang="en-GB" smtClean="0"/>
-              <a:t>14/09/2018</a:t>
+              <a:t>30/09/2021</a:t>
             </a:fld>
             <a:endParaRPr lang="en-GB"/>
           </a:p>
@@ -3546,233 +3546,6 @@
       </p:sp>
       <p:sp>
         <p:nvSpPr>
-          <p:cNvPr id="6" name="TextBox 5">
-            <a:extLst>
-              <a:ext uri="{FF2B5EF4-FFF2-40B4-BE49-F238E27FC236}">
-                <a16:creationId xmlns:a16="http://schemas.microsoft.com/office/drawing/2014/main" id="{D14797FA-3343-4C5E-8F1E-31C83F73F147}"/>
-              </a:ext>
-            </a:extLst>
-          </p:cNvPr>
-          <p:cNvSpPr txBox="1"/>
-          <p:nvPr/>
-        </p:nvSpPr>
-        <p:spPr>
-          <a:xfrm>
-            <a:off x="8474241" y="1856873"/>
-            <a:ext cx="2743200" cy="3139321"/>
-          </a:xfrm>
-          <a:prstGeom prst="rect">
-            <a:avLst/>
-          </a:prstGeom>
-        </p:spPr>
-        <p:txBody>
-          <a:bodyPr rot="0" spcFirstLastPara="0" vertOverflow="overflow" horzOverflow="overflow" vert="horz" wrap="square" lIns="91440" tIns="45720" rIns="91440" bIns="45720" numCol="1" spcCol="0" rtlCol="0" fromWordArt="0" anchor="t" anchorCtr="0" forceAA="0" compatLnSpc="1">
-            <a:prstTxWarp prst="textNoShape">
-              <a:avLst/>
-            </a:prstTxWarp>
-            <a:spAutoFit/>
-          </a:bodyPr>
-          <a:lstStyle/>
-          <a:p>
-            <a:pPr marL="342900" indent="-342900">
-              <a:buAutoNum type="arabicPeriod"/>
-            </a:pPr>
-            <a:r>
-              <a:rPr lang="en-US" dirty="0" err="1">
-                <a:cs typeface="Calibri"/>
-              </a:rPr>
-              <a:t>Нет</a:t>
-            </a:r>
-            <a:r>
-              <a:rPr lang="en-US" dirty="0">
-                <a:cs typeface="Calibri"/>
-              </a:rPr>
-              <a:t> </a:t>
-            </a:r>
-            <a:r>
-              <a:rPr lang="en-US" dirty="0" err="1">
-                <a:cs typeface="Calibri"/>
-              </a:rPr>
-              <a:t>информации</a:t>
-            </a:r>
-            <a:endParaRPr lang="en-US"/>
-          </a:p>
-          <a:p>
-            <a:pPr marL="342900" indent="-342900">
-              <a:buAutoNum type="arabicPeriod"/>
-            </a:pPr>
-            <a:r>
-              <a:rPr lang="en-US" dirty="0" err="1">
-                <a:cs typeface="Calibri"/>
-              </a:rPr>
-              <a:t>Интерактивный</a:t>
-            </a:r>
-          </a:p>
-          <a:p>
-            <a:pPr marL="342900" indent="-342900">
-              <a:buAutoNum type="arabicPeriod"/>
-            </a:pPr>
-            <a:r>
-              <a:rPr lang="en-US" dirty="0" err="1">
-                <a:cs typeface="Calibri"/>
-              </a:rPr>
-              <a:t>Сетевой</a:t>
-            </a:r>
-          </a:p>
-          <a:p>
-            <a:pPr marL="342900" indent="-342900">
-              <a:buAutoNum type="arabicPeriod"/>
-            </a:pPr>
-            <a:r>
-              <a:rPr lang="en-US" dirty="0">
-                <a:cs typeface="Calibri"/>
-              </a:rPr>
-              <a:t>Task manager/batch</a:t>
-            </a:r>
-          </a:p>
-          <a:p>
-            <a:pPr marL="342900" indent="-342900">
-              <a:buAutoNum type="arabicPeriod"/>
-            </a:pPr>
-            <a:r>
-              <a:rPr lang="en-US" dirty="0" err="1">
-                <a:cs typeface="Calibri"/>
-              </a:rPr>
-              <a:t>Сервис</a:t>
-            </a:r>
-          </a:p>
-          <a:p>
-            <a:pPr marL="342900" indent="-342900">
-              <a:buAutoNum type="arabicPeriod"/>
-            </a:pPr>
-            <a:r>
-              <a:rPr lang="en-US" dirty="0">
-                <a:cs typeface="Calibri"/>
-              </a:rPr>
-              <a:t>Proxy</a:t>
-            </a:r>
-          </a:p>
-          <a:p>
-            <a:pPr marL="342900" indent="-342900">
-              <a:buAutoNum type="arabicPeriod"/>
-            </a:pPr>
-            <a:r>
-              <a:rPr lang="en-US" dirty="0" err="1">
-                <a:cs typeface="Calibri"/>
-              </a:rPr>
-              <a:t>Разблокировка</a:t>
-            </a:r>
-          </a:p>
-          <a:p>
-            <a:pPr marL="342900" indent="-342900">
-              <a:buAutoNum type="arabicPeriod"/>
-            </a:pPr>
-            <a:r>
-              <a:rPr lang="en-US" dirty="0">
-                <a:cs typeface="Calibri"/>
-              </a:rPr>
-              <a:t>Network clear text</a:t>
-            </a:r>
-          </a:p>
-          <a:p>
-            <a:pPr marL="342900" indent="-342900">
-              <a:buAutoNum type="arabicPeriod"/>
-            </a:pPr>
-            <a:r>
-              <a:rPr lang="en-US" dirty="0" err="1">
-                <a:cs typeface="Calibri"/>
-              </a:rPr>
-              <a:t>Новый</a:t>
-            </a:r>
-            <a:r>
-              <a:rPr lang="en-US" dirty="0">
-                <a:cs typeface="Calibri"/>
-              </a:rPr>
-              <a:t> </a:t>
-            </a:r>
-            <a:r>
-              <a:rPr lang="en-US" dirty="0" err="1">
-                <a:cs typeface="Calibri"/>
-              </a:rPr>
-              <a:t>пользователь</a:t>
-            </a:r>
-            <a:r>
-              <a:rPr lang="en-US" dirty="0">
-                <a:cs typeface="Calibri"/>
-              </a:rPr>
-              <a:t> </a:t>
-            </a:r>
-          </a:p>
-          <a:p>
-            <a:pPr marL="342900" indent="-342900">
-              <a:buAutoNum type="arabicPeriod"/>
-            </a:pPr>
-            <a:r>
-              <a:rPr lang="en-US" dirty="0">
-                <a:cs typeface="Calibri"/>
-              </a:rPr>
-              <a:t>RDP</a:t>
-            </a:r>
-          </a:p>
-          <a:p>
-            <a:pPr marL="342900" indent="-342900">
-              <a:buAutoNum type="arabicPeriod"/>
-            </a:pPr>
-            <a:r>
-              <a:rPr lang="en-US" dirty="0" err="1">
-                <a:cs typeface="Calibri"/>
-              </a:rPr>
-              <a:t>Кэш</a:t>
-            </a:r>
-          </a:p>
-        </p:txBody>
-      </p:sp>
-      <p:sp>
-        <p:nvSpPr>
-          <p:cNvPr id="8" name="TextBox 7">
-            <a:extLst>
-              <a:ext uri="{FF2B5EF4-FFF2-40B4-BE49-F238E27FC236}">
-                <a16:creationId xmlns:a16="http://schemas.microsoft.com/office/drawing/2014/main" id="{F92FBDFB-6144-4AC7-B47D-085E4183C153}"/>
-              </a:ext>
-            </a:extLst>
-          </p:cNvPr>
-          <p:cNvSpPr txBox="1"/>
-          <p:nvPr/>
-        </p:nvSpPr>
-        <p:spPr>
-          <a:xfrm>
-            <a:off x="8474241" y="1596189"/>
-            <a:ext cx="2743200" cy="369332"/>
-          </a:xfrm>
-          <a:prstGeom prst="rect">
-            <a:avLst/>
-          </a:prstGeom>
-        </p:spPr>
-        <p:txBody>
-          <a:bodyPr rot="0" spcFirstLastPara="0" vertOverflow="overflow" horzOverflow="overflow" vert="horz" wrap="square" lIns="91440" tIns="45720" rIns="91440" bIns="45720" numCol="1" spcCol="0" rtlCol="0" fromWordArt="0" anchor="t" anchorCtr="0" forceAA="0" compatLnSpc="1">
-            <a:prstTxWarp prst="textNoShape">
-              <a:avLst/>
-            </a:prstTxWarp>
-            <a:spAutoFit/>
-          </a:bodyPr>
-          <a:lstStyle/>
-          <a:p>
-            <a:r>
-              <a:rPr lang="en-US" dirty="0"/>
-              <a:t>0.   </a:t>
-            </a:r>
-            <a:r>
-              <a:rPr lang="en-US" dirty="0" err="1"/>
-              <a:t>Система</a:t>
-            </a:r>
-            <a:endParaRPr lang="en-US" dirty="0" err="1">
-              <a:cs typeface="Calibri"/>
-            </a:endParaRPr>
-          </a:p>
-        </p:txBody>
-      </p:sp>
-      <p:sp>
-        <p:nvSpPr>
           <p:cNvPr id="9" name="Left Brace 8">
             <a:extLst>
               <a:ext uri="{FF2B5EF4-FFF2-40B4-BE49-F238E27FC236}">
@@ -3863,6 +3636,170 @@
           </a:fontRef>
         </p:style>
       </p:cxnSp>
+      <p:sp>
+        <p:nvSpPr>
+          <p:cNvPr id="11" name="TextBox 10">
+            <a:extLst>
+              <a:ext uri="{FF2B5EF4-FFF2-40B4-BE49-F238E27FC236}">
+                <a16:creationId xmlns:a16="http://schemas.microsoft.com/office/drawing/2014/main" id="{316CF866-2D38-9A46-A2B6-26D5F4E065E2}"/>
+              </a:ext>
+            </a:extLst>
+          </p:cNvPr>
+          <p:cNvSpPr txBox="1"/>
+          <p:nvPr/>
+        </p:nvSpPr>
+        <p:spPr>
+          <a:xfrm>
+            <a:off x="8362874" y="1559570"/>
+            <a:ext cx="2743200" cy="3416320"/>
+          </a:xfrm>
+          <a:prstGeom prst="rect">
+            <a:avLst/>
+          </a:prstGeom>
+        </p:spPr>
+        <p:txBody>
+          <a:bodyPr rot="0" spcFirstLastPara="0" vertOverflow="overflow" horzOverflow="overflow" vert="horz" wrap="square" lIns="91440" tIns="45720" rIns="91440" bIns="45720" numCol="1" spcCol="0" rtlCol="0" fromWordArt="0" anchor="t" anchorCtr="0" forceAA="0" compatLnSpc="1">
+            <a:prstTxWarp prst="textNoShape">
+              <a:avLst/>
+            </a:prstTxWarp>
+            <a:spAutoFit/>
+          </a:bodyPr>
+          <a:lstStyle/>
+          <a:p>
+            <a:pPr marL="342900" indent="-342900">
+              <a:buAutoNum type="arabicPeriod"/>
+            </a:pPr>
+            <a:r>
+              <a:rPr lang="en-US" dirty="0">
+                <a:cs typeface="Calibri"/>
+              </a:rPr>
+              <a:t>System</a:t>
+            </a:r>
+          </a:p>
+          <a:p>
+            <a:pPr marL="342900" indent="-342900">
+              <a:buAutoNum type="arabicPeriod"/>
+            </a:pPr>
+            <a:r>
+              <a:rPr lang="en-US" dirty="0">
+                <a:cs typeface="Calibri"/>
+              </a:rPr>
+              <a:t>???</a:t>
+            </a:r>
+          </a:p>
+          <a:p>
+            <a:pPr marL="342900" indent="-342900">
+              <a:buAutoNum type="arabicPeriod"/>
+            </a:pPr>
+            <a:r>
+              <a:rPr lang="en-US" dirty="0">
+                <a:cs typeface="Calibri"/>
+              </a:rPr>
+              <a:t>Interactive</a:t>
+            </a:r>
+            <a:endParaRPr lang="en-US" dirty="0"/>
+          </a:p>
+          <a:p>
+            <a:pPr marL="342900" indent="-342900">
+              <a:buAutoNum type="arabicPeriod"/>
+            </a:pPr>
+            <a:r>
+              <a:rPr lang="en-US" dirty="0">
+                <a:cs typeface="Calibri"/>
+              </a:rPr>
+              <a:t>Network</a:t>
+            </a:r>
+          </a:p>
+          <a:p>
+            <a:pPr marL="342900" indent="-342900">
+              <a:buAutoNum type="arabicPeriod"/>
+            </a:pPr>
+            <a:r>
+              <a:rPr lang="en-US" dirty="0">
+                <a:cs typeface="Calibri"/>
+              </a:rPr>
+              <a:t>Task manager/batch</a:t>
+            </a:r>
+          </a:p>
+          <a:p>
+            <a:pPr marL="342900" indent="-342900">
+              <a:buAutoNum type="arabicPeriod"/>
+            </a:pPr>
+            <a:r>
+              <a:rPr lang="en-US" dirty="0">
+                <a:cs typeface="Calibri"/>
+              </a:rPr>
+              <a:t>Service</a:t>
+            </a:r>
+          </a:p>
+          <a:p>
+            <a:pPr marL="342900" indent="-342900">
+              <a:buAutoNum type="arabicPeriod"/>
+            </a:pPr>
+            <a:r>
+              <a:rPr lang="en-US" dirty="0">
+                <a:cs typeface="Calibri"/>
+              </a:rPr>
+              <a:t>Proxy</a:t>
+            </a:r>
+          </a:p>
+          <a:p>
+            <a:pPr marL="342900" indent="-342900">
+              <a:buAutoNum type="arabicPeriod"/>
+            </a:pPr>
+            <a:r>
+              <a:rPr lang="en-US" dirty="0">
+                <a:cs typeface="Calibri"/>
+              </a:rPr>
+              <a:t>Unlock</a:t>
+            </a:r>
+          </a:p>
+          <a:p>
+            <a:pPr marL="342900" indent="-342900">
+              <a:buAutoNum type="arabicPeriod"/>
+            </a:pPr>
+            <a:r>
+              <a:rPr lang="en-US" dirty="0">
+                <a:cs typeface="Calibri"/>
+              </a:rPr>
+              <a:t>Network clear text</a:t>
+            </a:r>
+          </a:p>
+          <a:p>
+            <a:pPr marL="342900" indent="-342900">
+              <a:buAutoNum type="arabicPeriod"/>
+            </a:pPr>
+            <a:r>
+              <a:rPr lang="en-US" dirty="0">
+                <a:cs typeface="Calibri"/>
+              </a:rPr>
+              <a:t>New User </a:t>
+            </a:r>
+          </a:p>
+          <a:p>
+            <a:pPr marL="342900" indent="-342900">
+              <a:buAutoNum type="arabicPeriod"/>
+            </a:pPr>
+            <a:r>
+              <a:rPr lang="en-US" dirty="0">
+                <a:cs typeface="Calibri"/>
+              </a:rPr>
+              <a:t>RDP</a:t>
+            </a:r>
+          </a:p>
+          <a:p>
+            <a:pPr marL="342900" indent="-342900">
+              <a:buAutoNum type="arabicPeriod"/>
+            </a:pPr>
+            <a:r>
+              <a:rPr lang="en-US" dirty="0">
+                <a:cs typeface="Calibri"/>
+              </a:rPr>
+              <a:t>Cache</a:t>
+            </a:r>
+          </a:p>
+        </p:txBody>
+      </p:sp>
     </p:spTree>
     <p:extLst>
       <p:ext uri="{BB962C8B-B14F-4D97-AF65-F5344CB8AC3E}">
@@ -4792,7 +4729,7 @@
               </a:rPr>
               <a:t>%WINDIR%\System32</a:t>
             </a:r>
-            <a:endParaRPr lang="en-US" b="1">
+            <a:endParaRPr lang="en-US" b="1" dirty="0">
               <a:solidFill>
                 <a:schemeClr val="accent2">
                   <a:lumMod val="75000"/>
@@ -5796,7 +5733,7 @@
         <p:spPr>
           <a:xfrm>
             <a:off x="4644189" y="5205662"/>
-            <a:ext cx="2743200" cy="646331"/>
+            <a:ext cx="2743200" cy="369332"/>
           </a:xfrm>
           <a:prstGeom prst="rect">
             <a:avLst/>
@@ -5818,62 +5755,14 @@
                   <a:srgbClr val="7030A0"/>
                 </a:solidFill>
               </a:rPr>
-              <a:t>ID</a:t>
-            </a:r>
-            <a:r>
-              <a:rPr lang="en-US" b="1" dirty="0">
-                <a:solidFill>
-                  <a:srgbClr val="7030A0"/>
-                </a:solidFill>
-                <a:cs typeface="Calibri"/>
-              </a:rPr>
-              <a:t> </a:t>
-            </a:r>
-            <a:r>
-              <a:rPr lang="en-US" b="1" dirty="0" err="1">
-                <a:solidFill>
-                  <a:srgbClr val="7030A0"/>
-                </a:solidFill>
-                <a:cs typeface="Calibri"/>
-              </a:rPr>
-              <a:t>домена</a:t>
-            </a:r>
-            <a:r>
-              <a:rPr lang="en-US" b="1" dirty="0">
-                <a:solidFill>
-                  <a:srgbClr val="7030A0"/>
-                </a:solidFill>
-                <a:cs typeface="Calibri"/>
-              </a:rPr>
-              <a:t> </a:t>
-            </a:r>
-            <a:r>
-              <a:rPr lang="en-US" b="1" dirty="0" err="1">
-                <a:solidFill>
-                  <a:srgbClr val="7030A0"/>
-                </a:solidFill>
-                <a:cs typeface="Calibri"/>
-              </a:rPr>
-              <a:t>или</a:t>
-            </a:r>
-            <a:r>
-              <a:rPr lang="en-US" b="1" dirty="0">
-                <a:solidFill>
-                  <a:srgbClr val="7030A0"/>
-                </a:solidFill>
-                <a:cs typeface="Calibri"/>
-              </a:rPr>
-              <a:t> </a:t>
-            </a:r>
-            <a:r>
-              <a:rPr lang="en-US" b="1" dirty="0" err="1">
-                <a:solidFill>
-                  <a:srgbClr val="7030A0"/>
-                </a:solidFill>
-                <a:cs typeface="Calibri"/>
-              </a:rPr>
-              <a:t>компьютера</a:t>
-            </a:r>
+              <a:t>Domain or PC ID</a:t>
+            </a:r>
+            <a:endParaRPr lang="en-US" b="1" dirty="0">
+              <a:solidFill>
+                <a:srgbClr val="7030A0"/>
+              </a:solidFill>
+              <a:cs typeface="Calibri"/>
+            </a:endParaRPr>
           </a:p>
         </p:txBody>
       </p:sp>
@@ -5892,7 +5781,7 @@
         <p:spPr>
           <a:xfrm>
             <a:off x="2578767" y="2087477"/>
-            <a:ext cx="2743200" cy="369332"/>
+            <a:ext cx="2913650" cy="369332"/>
           </a:xfrm>
           <a:prstGeom prst="rect">
             <a:avLst/>
@@ -5909,24 +5798,14 @@
           <a:p>
             <a:pPr algn="ctr"/>
             <a:r>
-              <a:rPr lang="en-US" b="1" dirty="0" err="1">
+              <a:rPr lang="en-US" b="1" dirty="0">
                 <a:solidFill>
                   <a:schemeClr val="accent6">
                     <a:lumMod val="75000"/>
                   </a:schemeClr>
                 </a:solidFill>
               </a:rPr>
-              <a:t>Автор</a:t>
-            </a:r>
-            <a:r>
-              <a:rPr lang="en-US" b="1" dirty="0">
-                <a:solidFill>
-                  <a:schemeClr val="accent6">
-                    <a:lumMod val="75000"/>
-                  </a:schemeClr>
-                </a:solidFill>
-              </a:rPr>
-              <a:t> (Windows)</a:t>
+              <a:t>Who created it? (Windows)</a:t>
             </a:r>
             <a:endParaRPr lang="en-US" dirty="0">
               <a:solidFill>
@@ -5971,7 +5850,7 @@
           <a:p>
             <a:pPr algn="ctr"/>
             <a:r>
-              <a:rPr lang="en-US" b="1" dirty="0" err="1">
+              <a:rPr lang="en-US" b="1" dirty="0">
                 <a:solidFill>
                   <a:schemeClr val="accent1">
                     <a:lumMod val="75000"/>
@@ -5979,18 +5858,7 @@
                 </a:solidFill>
                 <a:cs typeface="Calibri"/>
               </a:rPr>
-              <a:t>Версия</a:t>
-            </a:r>
-            <a:r>
-              <a:rPr lang="en-US" b="1" dirty="0">
-                <a:solidFill>
-                  <a:schemeClr val="accent1">
-                    <a:lumMod val="75000"/>
-                  </a:schemeClr>
-                </a:solidFill>
-                <a:cs typeface="Calibri"/>
-              </a:rPr>
-              <a:t> SID</a:t>
+              <a:t>SID version</a:t>
             </a:r>
           </a:p>
         </p:txBody>
@@ -6224,16 +6092,10 @@
               <a:t>- </a:t>
             </a:r>
             <a:r>
-              <a:rPr lang="en-US" dirty="0" err="1">
-                <a:cs typeface="Calibri"/>
-              </a:rPr>
-              <a:t>встроенный</a:t>
-            </a:r>
-            <a:r>
               <a:rPr lang="en-US" dirty="0">
                 <a:cs typeface="Calibri"/>
               </a:rPr>
-              <a:t> admin</a:t>
+              <a:t>default admin</a:t>
             </a:r>
           </a:p>
           <a:p>
@@ -6313,16 +6175,10 @@
               <a:t>- </a:t>
             </a:r>
             <a:r>
-              <a:rPr lang="en-US" dirty="0" err="1">
-                <a:cs typeface="Calibri"/>
-              </a:rPr>
-              <a:t>встроенный</a:t>
-            </a:r>
-            <a:r>
               <a:rPr lang="en-US" dirty="0">
                 <a:cs typeface="Calibri"/>
               </a:rPr>
-              <a:t> guest</a:t>
+              <a:t> default  guest</a:t>
             </a:r>
           </a:p>
           <a:p>
@@ -6402,38 +6258,11 @@
               <a:t>- </a:t>
             </a:r>
             <a:r>
-              <a:rPr lang="en-US" dirty="0" err="1">
-                <a:cs typeface="Calibri"/>
-              </a:rPr>
-              <a:t>первый</a:t>
-            </a:r>
-            <a:r>
               <a:rPr lang="en-US" dirty="0">
                 <a:cs typeface="Calibri"/>
               </a:rPr>
-              <a:t> </a:t>
-            </a:r>
-            <a:r>
-              <a:rPr lang="en-US" dirty="0" err="1">
-                <a:cs typeface="Calibri"/>
-              </a:rPr>
-              <a:t>созданный</a:t>
-            </a:r>
-            <a:r>
-              <a:rPr lang="en-US" dirty="0">
-                <a:cs typeface="Calibri"/>
-              </a:rPr>
-              <a:t> </a:t>
-            </a:r>
-            <a:r>
-              <a:rPr lang="en-US" dirty="0" err="1">
-                <a:cs typeface="Calibri"/>
-              </a:rPr>
-              <a:t>пользователь</a:t>
-            </a:r>
-            <a:endParaRPr lang="en-US" dirty="0">
-              <a:cs typeface="Calibri"/>
-            </a:endParaRPr>
+              <a:t>the first user created</a:t>
+            </a:r>
           </a:p>
           <a:p>
             <a:r>
@@ -6732,62 +6561,7 @@
                 </a:solidFill>
                 <a:cs typeface="Calibri"/>
               </a:rPr>
-              <a:t>- </a:t>
-            </a:r>
-            <a:r>
-              <a:rPr lang="en-US" dirty="0" err="1">
-                <a:solidFill>
-                  <a:schemeClr val="accent2">
-                    <a:lumMod val="75000"/>
-                  </a:schemeClr>
-                </a:solidFill>
-                <a:cs typeface="Calibri"/>
-              </a:rPr>
-              <a:t>группа</a:t>
-            </a:r>
-            <a:r>
-              <a:rPr lang="en-US" dirty="0">
-                <a:solidFill>
-                  <a:schemeClr val="accent2">
-                    <a:lumMod val="75000"/>
-                  </a:schemeClr>
-                </a:solidFill>
-                <a:cs typeface="Calibri"/>
-              </a:rPr>
-              <a:t> </a:t>
-            </a:r>
-            <a:r>
-              <a:rPr lang="en-US" dirty="0" err="1">
-                <a:solidFill>
-                  <a:schemeClr val="accent2">
-                    <a:lumMod val="75000"/>
-                  </a:schemeClr>
-                </a:solidFill>
-                <a:cs typeface="Calibri"/>
-              </a:rPr>
-              <a:t>локальных</a:t>
-            </a:r>
-            <a:r>
-              <a:rPr lang="en-US" dirty="0">
-                <a:solidFill>
-                  <a:schemeClr val="accent2">
-                    <a:lumMod val="75000"/>
-                  </a:schemeClr>
-                </a:solidFill>
-                <a:cs typeface="Calibri"/>
-              </a:rPr>
-              <a:t> </a:t>
-            </a:r>
-            <a:r>
-              <a:rPr lang="en-US" dirty="0" err="1">
-                <a:solidFill>
-                  <a:schemeClr val="accent2">
-                    <a:lumMod val="75000"/>
-                  </a:schemeClr>
-                </a:solidFill>
-                <a:cs typeface="Calibri"/>
-              </a:rPr>
-              <a:t>администраторов</a:t>
+              <a:t>- local admin group</a:t>
             </a:r>
           </a:p>
           <a:p>
@@ -9782,7 +9556,7 @@
         </p:nvSpPr>
         <p:spPr>
           <a:xfrm>
-            <a:off x="677779" y="345073"/>
+            <a:off x="0" y="-300094"/>
             <a:ext cx="10515600" cy="1325563"/>
           </a:xfrm>
         </p:spPr>
@@ -9791,12 +9565,24 @@
           <a:lstStyle/>
           <a:p>
             <a:r>
-              <a:rPr lang="en-US">
+              <a:rPr lang="en-US" dirty="0" err="1">
                 <a:cs typeface="Calibri Light"/>
               </a:rPr>
-              <a:t>Типы входа</a:t>
-            </a:r>
-            <a:endParaRPr lang="en-US"/>
+              <a:t>Типы</a:t>
+            </a:r>
+            <a:r>
+              <a:rPr lang="en-US" dirty="0">
+                <a:cs typeface="Calibri Light"/>
+              </a:rPr>
+              <a:t> </a:t>
+            </a:r>
+            <a:r>
+              <a:rPr lang="en-US" dirty="0" err="1">
+                <a:cs typeface="Calibri Light"/>
+              </a:rPr>
+              <a:t>входа</a:t>
+            </a:r>
+            <a:endParaRPr lang="en-US" dirty="0"/>
           </a:p>
         </p:txBody>
       </p:sp>
@@ -10566,36 +10352,33 @@
               <a:buAutoNum type="arabicPeriod"/>
             </a:pPr>
             <a:r>
-              <a:rPr lang="en-US">
+              <a:rPr lang="en-US" dirty="0">
                 <a:cs typeface="Calibri"/>
               </a:rPr>
               <a:t>???</a:t>
             </a:r>
-            <a:endParaRPr lang="en-US" dirty="0">
-              <a:cs typeface="Calibri"/>
-            </a:endParaRPr>
           </a:p>
           <a:p>
             <a:pPr marL="342900" indent="-342900">
               <a:buAutoNum type="arabicPeriod"/>
             </a:pPr>
             <a:r>
-              <a:rPr lang="en-US" err="1">
-                <a:cs typeface="Calibri"/>
-              </a:rPr>
-              <a:t>Интерактивный</a:t>
-            </a:r>
-            <a:endParaRPr lang="en-US"/>
+              <a:rPr lang="en-US" dirty="0">
+                <a:cs typeface="Calibri"/>
+              </a:rPr>
+              <a:t>Interactive</a:t>
+            </a:r>
+            <a:endParaRPr lang="en-US" dirty="0"/>
           </a:p>
           <a:p>
             <a:pPr marL="342900" indent="-342900">
               <a:buAutoNum type="arabicPeriod"/>
             </a:pPr>
             <a:r>
-              <a:rPr lang="en-US" dirty="0" err="1">
-                <a:cs typeface="Calibri"/>
-              </a:rPr>
-              <a:t>Сетевой</a:t>
+              <a:rPr lang="en-US" dirty="0">
+                <a:cs typeface="Calibri"/>
+              </a:rPr>
+              <a:t>Network</a:t>
             </a:r>
           </a:p>
           <a:p>
@@ -10614,10 +10397,10 @@
               <a:buAutoNum type="arabicPeriod"/>
             </a:pPr>
             <a:r>
-              <a:rPr lang="en-US" dirty="0" err="1">
-                <a:cs typeface="Calibri"/>
-              </a:rPr>
-              <a:t>Сервис</a:t>
+              <a:rPr lang="en-US" dirty="0">
+                <a:cs typeface="Calibri"/>
+              </a:rPr>
+              <a:t>Service</a:t>
             </a:r>
           </a:p>
           <a:p>
@@ -10636,10 +10419,10 @@
               <a:buAutoNum type="arabicPeriod"/>
             </a:pPr>
             <a:r>
-              <a:rPr lang="en-US" dirty="0" err="1">
-                <a:cs typeface="Calibri"/>
-              </a:rPr>
-              <a:t>Разблокировка</a:t>
+              <a:rPr lang="en-US" dirty="0">
+                <a:cs typeface="Calibri"/>
+              </a:rPr>
+              <a:t>Unlock</a:t>
             </a:r>
           </a:p>
           <a:p>
@@ -10658,28 +10441,10 @@
               <a:buAutoNum type="arabicPeriod"/>
             </a:pPr>
             <a:r>
-              <a:rPr lang="en-US" dirty="0" err="1">
-                <a:cs typeface="Calibri"/>
-              </a:rPr>
-              <a:t>Новый</a:t>
-            </a:r>
-            <a:r>
               <a:rPr lang="en-US" dirty="0">
                 <a:cs typeface="Calibri"/>
               </a:rPr>
-              <a:t> </a:t>
-            </a:r>
-            <a:r>
-              <a:rPr lang="en-US" dirty="0" err="1">
-                <a:cs typeface="Calibri"/>
-              </a:rPr>
-              <a:t>пользователь</a:t>
-            </a:r>
-            <a:r>
-              <a:rPr lang="en-US" dirty="0">
-                <a:cs typeface="Calibri"/>
-              </a:rPr>
-              <a:t> </a:t>
+              <a:t>New User </a:t>
             </a:r>
           </a:p>
           <a:p>
@@ -10698,10 +10463,10 @@
               <a:buAutoNum type="arabicPeriod"/>
             </a:pPr>
             <a:r>
-              <a:rPr lang="en-US" dirty="0" err="1">
-                <a:cs typeface="Calibri"/>
-              </a:rPr>
-              <a:t>Кэш</a:t>
+              <a:rPr lang="en-US" dirty="0">
+                <a:cs typeface="Calibri"/>
+              </a:rPr>
+              <a:t>Cache</a:t>
             </a:r>
           </a:p>
         </p:txBody>
@@ -10738,13 +10503,9 @@
           <a:p>
             <a:r>
               <a:rPr lang="en-US" dirty="0"/>
-              <a:t>0.   </a:t>
-            </a:r>
-            <a:r>
-              <a:rPr lang="en-US" dirty="0" err="1"/>
-              <a:t>Система</a:t>
-            </a:r>
-            <a:endParaRPr lang="en-US" dirty="0" err="1">
+              <a:t>0.   System</a:t>
+            </a:r>
+            <a:endParaRPr lang="en-US" dirty="0">
               <a:cs typeface="Calibri"/>
             </a:endParaRPr>
           </a:p>

</xml_diff>